<commit_message>
Last commit I did added a bunch of stuff, so I'm fixing it
</commit_message>
<xml_diff>
--- a/matthews-slides.pptx
+++ b/matthews-slides.pptx
@@ -200,7 +200,7 @@
           <a:p>
             <a:fld id="{A346A21E-F657-4AB3-AA2E-300EC2325DEE}" type="datetimeFigureOut">
               <a:rPr lang="en-US" smtClean="0"/>
-              <a:t>5/9/2022</a:t>
+              <a:t>5/10/2022</a:t>
             </a:fld>
             <a:endParaRPr lang="en-US"/>
           </a:p>
@@ -632,7 +632,7 @@
             <a:fld id="{276D79ED-3FA7-4EF8-964B-EB8BCFAB02F8}" type="datetimeFigureOut">
               <a:rPr lang="en-US" smtClean="0"/>
               <a:pPr/>
-              <a:t>5/9/2022</a:t>
+              <a:t>5/10/2022</a:t>
             </a:fld>
             <a:endParaRPr lang="en-US"/>
           </a:p>
@@ -878,7 +878,7 @@
           <a:p>
             <a:fld id="{276D79ED-3FA7-4EF8-964B-EB8BCFAB02F8}" type="datetimeFigureOut">
               <a:rPr lang="en-US" smtClean="0"/>
-              <a:t>5/9/2022</a:t>
+              <a:t>5/10/2022</a:t>
             </a:fld>
             <a:endParaRPr lang="en-US"/>
           </a:p>
@@ -1155,7 +1155,7 @@
           <a:p>
             <a:fld id="{276D79ED-3FA7-4EF8-964B-EB8BCFAB02F8}" type="datetimeFigureOut">
               <a:rPr lang="en-US" smtClean="0"/>
-              <a:t>5/9/2022</a:t>
+              <a:t>5/10/2022</a:t>
             </a:fld>
             <a:endParaRPr lang="en-US"/>
           </a:p>
@@ -1396,7 +1396,7 @@
           <a:p>
             <a:fld id="{276D79ED-3FA7-4EF8-964B-EB8BCFAB02F8}" type="datetimeFigureOut">
               <a:rPr lang="en-US" smtClean="0"/>
-              <a:t>5/9/2022</a:t>
+              <a:t>5/10/2022</a:t>
             </a:fld>
             <a:endParaRPr lang="en-US"/>
           </a:p>
@@ -1760,7 +1760,7 @@
           <a:p>
             <a:fld id="{276D79ED-3FA7-4EF8-964B-EB8BCFAB02F8}" type="datetimeFigureOut">
               <a:rPr lang="en-US" smtClean="0"/>
-              <a:t>5/9/2022</a:t>
+              <a:t>5/10/2022</a:t>
             </a:fld>
             <a:endParaRPr lang="en-US"/>
           </a:p>
@@ -1877,7 +1877,7 @@
           <a:p>
             <a:fld id="{276D79ED-3FA7-4EF8-964B-EB8BCFAB02F8}" type="datetimeFigureOut">
               <a:rPr lang="en-US" smtClean="0"/>
-              <a:t>5/9/2022</a:t>
+              <a:t>5/10/2022</a:t>
             </a:fld>
             <a:endParaRPr lang="en-US"/>
           </a:p>
@@ -1972,7 +1972,7 @@
           <a:p>
             <a:fld id="{276D79ED-3FA7-4EF8-964B-EB8BCFAB02F8}" type="datetimeFigureOut">
               <a:rPr lang="en-US" smtClean="0"/>
-              <a:t>5/9/2022</a:t>
+              <a:t>5/10/2022</a:t>
             </a:fld>
             <a:endParaRPr lang="en-US"/>
           </a:p>
@@ -2248,7 +2248,7 @@
           <a:p>
             <a:fld id="{276D79ED-3FA7-4EF8-964B-EB8BCFAB02F8}" type="datetimeFigureOut">
               <a:rPr lang="en-US" smtClean="0"/>
-              <a:t>5/9/2022</a:t>
+              <a:t>5/10/2022</a:t>
             </a:fld>
             <a:endParaRPr lang="en-US"/>
           </a:p>
@@ -2504,7 +2504,7 @@
           <a:p>
             <a:fld id="{276D79ED-3FA7-4EF8-964B-EB8BCFAB02F8}" type="datetimeFigureOut">
               <a:rPr lang="en-US" smtClean="0"/>
-              <a:t>5/9/2022</a:t>
+              <a:t>5/10/2022</a:t>
             </a:fld>
             <a:endParaRPr lang="en-US"/>
           </a:p>
@@ -2728,7 +2728,7 @@
             <a:fld id="{276D79ED-3FA7-4EF8-964B-EB8BCFAB02F8}" type="datetimeFigureOut">
               <a:rPr lang="en-US" smtClean="0"/>
               <a:pPr/>
-              <a:t>5/9/2022</a:t>
+              <a:t>5/10/2022</a:t>
             </a:fld>
             <a:endParaRPr lang="en-US"/>
           </a:p>
@@ -3271,12 +3271,108 @@
           <a:chExt cx="0" cy="0"/>
         </a:xfrm>
       </p:grpSpPr>
+      <p:sp>
+        <p:nvSpPr>
+          <p:cNvPr id="2" name="TextBox 1">
+            <a:extLst>
+              <a:ext uri="{FF2B5EF4-FFF2-40B4-BE49-F238E27FC236}">
+                <a16:creationId xmlns:a16="http://schemas.microsoft.com/office/drawing/2014/main" id="{7374CFB8-748E-8E29-4A37-D0F91B4884B9}"/>
+              </a:ext>
+            </a:extLst>
+          </p:cNvPr>
+          <p:cNvSpPr txBox="1"/>
+          <p:nvPr/>
+        </p:nvSpPr>
+        <p:spPr>
+          <a:xfrm>
+            <a:off x="326572" y="2175327"/>
+            <a:ext cx="3978286" cy="2062103"/>
+          </a:xfrm>
+          <a:prstGeom prst="rect">
+            <a:avLst/>
+          </a:prstGeom>
+          <a:noFill/>
+        </p:spPr>
+        <p:txBody>
+          <a:bodyPr wrap="square" rtlCol="0">
+            <a:spAutoFit/>
+          </a:bodyPr>
+          <a:lstStyle/>
+          <a:p>
+            <a:r>
+              <a:rPr lang="en-US" sz="1600" dirty="0"/>
+              <a:t>Using the ranking in the Daily Top 10 as a metric for popularity: </a:t>
+            </a:r>
+          </a:p>
+          <a:p>
+            <a:endParaRPr lang="en-US" sz="1600" dirty="0"/>
+          </a:p>
+          <a:p>
+            <a:r>
+              <a:rPr lang="en-US" sz="1600" dirty="0"/>
+              <a:t>It appears that Netflix produced content ranked higher on average</a:t>
+            </a:r>
+          </a:p>
+          <a:p>
+            <a:endParaRPr lang="en-US" sz="1600" dirty="0"/>
+          </a:p>
+          <a:p>
+            <a:r>
+              <a:rPr lang="en-US" sz="1600" dirty="0"/>
+              <a:t>Shows tended  to do slightly better than movies</a:t>
+            </a:r>
+          </a:p>
+        </p:txBody>
+      </p:sp>
+      <p:sp>
+        <p:nvSpPr>
+          <p:cNvPr id="4" name="TextBox 3">
+            <a:extLst>
+              <a:ext uri="{FF2B5EF4-FFF2-40B4-BE49-F238E27FC236}">
+                <a16:creationId xmlns:a16="http://schemas.microsoft.com/office/drawing/2014/main" id="{1D2B55F2-D572-81CE-F488-2E69D07CBF0D}"/>
+              </a:ext>
+            </a:extLst>
+          </p:cNvPr>
+          <p:cNvSpPr txBox="1"/>
+          <p:nvPr/>
+        </p:nvSpPr>
+        <p:spPr>
+          <a:xfrm>
+            <a:off x="468085" y="6373586"/>
+            <a:ext cx="7184571" cy="369332"/>
+          </a:xfrm>
+          <a:prstGeom prst="rect">
+            <a:avLst/>
+          </a:prstGeom>
+          <a:noFill/>
+        </p:spPr>
+        <p:txBody>
+          <a:bodyPr wrap="square" rtlCol="0">
+            <a:spAutoFit/>
+          </a:bodyPr>
+          <a:lstStyle/>
+          <a:p>
+            <a:r>
+              <a:rPr lang="en-US" sz="1800" b="0" i="0" u="sng" strike="noStrike" dirty="0">
+                <a:solidFill>
+                  <a:srgbClr val="1155CC"/>
+                </a:solidFill>
+                <a:effectLst/>
+                <a:latin typeface="Arial" panose="020B0604020202020204" pitchFamily="34" charset="0"/>
+                <a:hlinkClick r:id="rId2"/>
+              </a:rPr>
+              <a:t>https://www.kaggle.com/datasets/prasertk/netflix-daily-top-10-in-us</a:t>
+            </a:r>
+            <a:endParaRPr lang="en-US" dirty="0"/>
+          </a:p>
+        </p:txBody>
+      </p:sp>
       <p:pic>
         <p:nvPicPr>
-          <p:cNvPr id="11" name="Picture 10" descr="Chart, box and whisker chart&#10;&#10;Description automatically generated">
+          <p:cNvPr id="7" name="Picture 6" descr="Chart, box and whisker chart&#10;&#10;Description automatically generated">
             <a:extLst>
               <a:ext uri="{FF2B5EF4-FFF2-40B4-BE49-F238E27FC236}">
-                <a16:creationId xmlns:a16="http://schemas.microsoft.com/office/drawing/2014/main" id="{AB4C5956-CBA8-1B11-4B8F-EA53AAF9D20D}"/>
+                <a16:creationId xmlns:a16="http://schemas.microsoft.com/office/drawing/2014/main" id="{638B0EAC-82DD-C5D7-63AA-6E919A5D2688}"/>
               </a:ext>
             </a:extLst>
           </p:cNvPr>
@@ -3286,7 +3382,7 @@
           <p:nvPr/>
         </p:nvPicPr>
         <p:blipFill>
-          <a:blip r:embed="rId2">
+          <a:blip r:embed="rId3">
             <a:extLst>
               <a:ext uri="{28A0092B-C50C-407E-A947-70E740481C1C}">
                 <a14:useLocalDpi xmlns:a14="http://schemas.microsoft.com/office/drawing/2010/main" val="0"/>
@@ -3299,8 +3395,8 @@
         </p:blipFill>
         <p:spPr>
           <a:xfrm>
-            <a:off x="4304858" y="1560284"/>
-            <a:ext cx="6620871" cy="3485243"/>
+            <a:off x="4416878" y="1240143"/>
+            <a:ext cx="7337413" cy="3932470"/>
           </a:xfrm>
           <a:prstGeom prst="rect">
             <a:avLst/>
@@ -3309,10 +3405,10 @@
       </p:pic>
       <p:sp>
         <p:nvSpPr>
-          <p:cNvPr id="2" name="TextBox 1">
+          <p:cNvPr id="10" name="TextBox 9">
             <a:extLst>
               <a:ext uri="{FF2B5EF4-FFF2-40B4-BE49-F238E27FC236}">
-                <a16:creationId xmlns:a16="http://schemas.microsoft.com/office/drawing/2014/main" id="{7374CFB8-748E-8E29-4A37-D0F91B4884B9}"/>
+                <a16:creationId xmlns:a16="http://schemas.microsoft.com/office/drawing/2014/main" id="{1B04E097-D68B-EBE2-E8CB-27324F2F7323}"/>
               </a:ext>
             </a:extLst>
           </p:cNvPr>
@@ -3321,8 +3417,8 @@
         </p:nvSpPr>
         <p:spPr>
           <a:xfrm>
-            <a:off x="326572" y="2175327"/>
-            <a:ext cx="3978286" cy="2062103"/>
+            <a:off x="326572" y="231717"/>
+            <a:ext cx="8756196" cy="523220"/>
           </a:xfrm>
           <a:prstGeom prst="rect">
             <a:avLst/>
@@ -3336,70 +3432,9 @@
           <a:lstStyle/>
           <a:p>
             <a:r>
-              <a:rPr lang="en-US" sz="1600" dirty="0"/>
-              <a:t>Using the ranking in the Daily Top 10 as a metric for popularity: </a:t>
-            </a:r>
-          </a:p>
-          <a:p>
-            <a:endParaRPr lang="en-US" sz="1600" dirty="0"/>
-          </a:p>
-          <a:p>
-            <a:r>
-              <a:rPr lang="en-US" sz="1600" dirty="0"/>
-              <a:t>It appears that Netflix produced content ranked higher on average</a:t>
-            </a:r>
-          </a:p>
-          <a:p>
-            <a:endParaRPr lang="en-US" sz="1600" dirty="0"/>
-          </a:p>
-          <a:p>
-            <a:r>
-              <a:rPr lang="en-US" sz="1600" dirty="0"/>
-              <a:t>Shows tended  to do slightly better than movies</a:t>
-            </a:r>
-          </a:p>
-        </p:txBody>
-      </p:sp>
-      <p:sp>
-        <p:nvSpPr>
-          <p:cNvPr id="4" name="TextBox 3">
-            <a:extLst>
-              <a:ext uri="{FF2B5EF4-FFF2-40B4-BE49-F238E27FC236}">
-                <a16:creationId xmlns:a16="http://schemas.microsoft.com/office/drawing/2014/main" id="{1D2B55F2-D572-81CE-F488-2E69D07CBF0D}"/>
-              </a:ext>
-            </a:extLst>
-          </p:cNvPr>
-          <p:cNvSpPr txBox="1"/>
-          <p:nvPr/>
-        </p:nvSpPr>
-        <p:spPr>
-          <a:xfrm>
-            <a:off x="468085" y="6373586"/>
-            <a:ext cx="7184571" cy="369332"/>
-          </a:xfrm>
-          <a:prstGeom prst="rect">
-            <a:avLst/>
-          </a:prstGeom>
-          <a:noFill/>
-        </p:spPr>
-        <p:txBody>
-          <a:bodyPr wrap="square" rtlCol="0">
-            <a:spAutoFit/>
-          </a:bodyPr>
-          <a:lstStyle/>
-          <a:p>
-            <a:r>
-              <a:rPr lang="en-US" sz="1800" b="0" i="0" u="sng" strike="noStrike" dirty="0">
-                <a:solidFill>
-                  <a:srgbClr val="1155CC"/>
-                </a:solidFill>
-                <a:effectLst/>
-                <a:latin typeface="Arial" panose="020B0604020202020204" pitchFamily="34" charset="0"/>
-                <a:hlinkClick r:id="rId3"/>
-              </a:rPr>
-              <a:t>https://www.kaggle.com/datasets/prasertk/netflix-daily-top-10-in-us</a:t>
-            </a:r>
-            <a:endParaRPr lang="en-US" dirty="0"/>
+              <a:rPr lang="en-US" sz="2800" b="1" dirty="0"/>
+              <a:t>What Kind of Content Appeared in the Daily Top 10?</a:t>
+            </a:r>
           </a:p>
         </p:txBody>
       </p:sp>
@@ -3708,6 +3743,41 @@
           </a:p>
         </p:txBody>
       </p:sp>
+      <p:sp>
+        <p:nvSpPr>
+          <p:cNvPr id="15" name="TextBox 14">
+            <a:extLst>
+              <a:ext uri="{FF2B5EF4-FFF2-40B4-BE49-F238E27FC236}">
+                <a16:creationId xmlns:a16="http://schemas.microsoft.com/office/drawing/2014/main" id="{F1A414C9-3CB5-F387-4844-DF86D794A77A}"/>
+              </a:ext>
+            </a:extLst>
+          </p:cNvPr>
+          <p:cNvSpPr txBox="1"/>
+          <p:nvPr/>
+        </p:nvSpPr>
+        <p:spPr>
+          <a:xfrm>
+            <a:off x="326572" y="231717"/>
+            <a:ext cx="8756196" cy="523220"/>
+          </a:xfrm>
+          <a:prstGeom prst="rect">
+            <a:avLst/>
+          </a:prstGeom>
+          <a:noFill/>
+        </p:spPr>
+        <p:txBody>
+          <a:bodyPr wrap="square" rtlCol="0">
+            <a:spAutoFit/>
+          </a:bodyPr>
+          <a:lstStyle/>
+          <a:p>
+            <a:r>
+              <a:rPr lang="en-US" sz="2800" b="1" dirty="0"/>
+              <a:t>What Kind of Content Appeared in the Daily Top 10?</a:t>
+            </a:r>
+          </a:p>
+        </p:txBody>
+      </p:sp>
     </p:spTree>
     <p:extLst>
       <p:ext uri="{BB962C8B-B14F-4D97-AF65-F5344CB8AC3E}">
@@ -3738,12 +3808,154 @@
           <a:chExt cx="0" cy="0"/>
         </a:xfrm>
       </p:grpSpPr>
+      <p:sp>
+        <p:nvSpPr>
+          <p:cNvPr id="8" name="TextBox 7">
+            <a:extLst>
+              <a:ext uri="{FF2B5EF4-FFF2-40B4-BE49-F238E27FC236}">
+                <a16:creationId xmlns:a16="http://schemas.microsoft.com/office/drawing/2014/main" id="{F1DF0CE1-BDB7-035E-BBAD-52A05B6CA441}"/>
+              </a:ext>
+            </a:extLst>
+          </p:cNvPr>
+          <p:cNvSpPr txBox="1"/>
+          <p:nvPr/>
+        </p:nvSpPr>
+        <p:spPr>
+          <a:xfrm>
+            <a:off x="1866900" y="5714056"/>
+            <a:ext cx="6480581" cy="800219"/>
+          </a:xfrm>
+          <a:prstGeom prst="rect">
+            <a:avLst/>
+          </a:prstGeom>
+          <a:noFill/>
+        </p:spPr>
+        <p:txBody>
+          <a:bodyPr wrap="square" rtlCol="0">
+            <a:spAutoFit/>
+          </a:bodyPr>
+          <a:lstStyle/>
+          <a:p>
+            <a:r>
+              <a:rPr lang="en-US" sz="1400" dirty="0"/>
+              <a:t>Important to note that “</a:t>
+            </a:r>
+            <a:r>
+              <a:rPr lang="en-US" sz="1400" dirty="0" err="1"/>
+              <a:t>Cocomelon</a:t>
+            </a:r>
+            <a:r>
+              <a:rPr lang="en-US" sz="1400" dirty="0"/>
+              <a:t>” was removed from the data for this graph, it appeared a total of 428 days out of 710. Making the Top 10 list 60% of the time</a:t>
+            </a:r>
+          </a:p>
+          <a:p>
+            <a:endParaRPr lang="en-US" dirty="0"/>
+          </a:p>
+        </p:txBody>
+      </p:sp>
+      <p:sp>
+        <p:nvSpPr>
+          <p:cNvPr id="9" name="TextBox 8">
+            <a:extLst>
+              <a:ext uri="{FF2B5EF4-FFF2-40B4-BE49-F238E27FC236}">
+                <a16:creationId xmlns:a16="http://schemas.microsoft.com/office/drawing/2014/main" id="{4C89E97F-A041-AFDD-52FB-C7A31444457D}"/>
+              </a:ext>
+            </a:extLst>
+          </p:cNvPr>
+          <p:cNvSpPr txBox="1"/>
+          <p:nvPr/>
+        </p:nvSpPr>
+        <p:spPr>
+          <a:xfrm>
+            <a:off x="174171" y="1415143"/>
+            <a:ext cx="3385458" cy="3139321"/>
+          </a:xfrm>
+          <a:prstGeom prst="rect">
+            <a:avLst/>
+          </a:prstGeom>
+          <a:noFill/>
+        </p:spPr>
+        <p:txBody>
+          <a:bodyPr wrap="square" rtlCol="0">
+            <a:spAutoFit/>
+          </a:bodyPr>
+          <a:lstStyle/>
+          <a:p>
+            <a:r>
+              <a:rPr lang="en-US" dirty="0"/>
+              <a:t>The bulk of shows were on the Top 10 list for 5 to 20 days, with frequent outliers staying much longer</a:t>
+            </a:r>
+          </a:p>
+          <a:p>
+            <a:endParaRPr lang="en-US" dirty="0"/>
+          </a:p>
+          <a:p>
+            <a:endParaRPr lang="en-US" dirty="0"/>
+          </a:p>
+          <a:p>
+            <a:endParaRPr lang="en-US" dirty="0"/>
+          </a:p>
+          <a:p>
+            <a:endParaRPr lang="en-US" dirty="0"/>
+          </a:p>
+          <a:p>
+            <a:r>
+              <a:rPr lang="en-US" dirty="0"/>
+              <a:t>Movies stayed on the Top 10 mostly for less than 10 days, and never more than 40</a:t>
+            </a:r>
+          </a:p>
+        </p:txBody>
+      </p:sp>
+      <p:sp>
+        <p:nvSpPr>
+          <p:cNvPr id="10" name="TextBox 9">
+            <a:extLst>
+              <a:ext uri="{FF2B5EF4-FFF2-40B4-BE49-F238E27FC236}">
+                <a16:creationId xmlns:a16="http://schemas.microsoft.com/office/drawing/2014/main" id="{3C404601-FFE3-1EFA-D973-711348F6A319}"/>
+              </a:ext>
+            </a:extLst>
+          </p:cNvPr>
+          <p:cNvSpPr txBox="1"/>
+          <p:nvPr/>
+        </p:nvSpPr>
+        <p:spPr>
+          <a:xfrm>
+            <a:off x="468085" y="6373586"/>
+            <a:ext cx="7184571" cy="369332"/>
+          </a:xfrm>
+          <a:prstGeom prst="rect">
+            <a:avLst/>
+          </a:prstGeom>
+          <a:noFill/>
+        </p:spPr>
+        <p:txBody>
+          <a:bodyPr wrap="square" rtlCol="0">
+            <a:spAutoFit/>
+          </a:bodyPr>
+          <a:lstStyle/>
+          <a:p>
+            <a:r>
+              <a:rPr lang="en-US" sz="1800" b="0" i="0" u="sng" strike="noStrike" dirty="0">
+                <a:solidFill>
+                  <a:srgbClr val="1155CC"/>
+                </a:solidFill>
+                <a:effectLst/>
+                <a:latin typeface="Arial" panose="020B0604020202020204" pitchFamily="34" charset="0"/>
+                <a:hlinkClick r:id="rId2"/>
+              </a:rPr>
+              <a:t>https://www.kaggle.com/datasets/prasertk/netflix-daily-top-10-in-us</a:t>
+            </a:r>
+            <a:endParaRPr lang="en-US" dirty="0"/>
+          </a:p>
+        </p:txBody>
+      </p:sp>
       <p:pic>
         <p:nvPicPr>
-          <p:cNvPr id="7" name="Picture 6" descr="Chart, box and whisker chart&#10;&#10;Description automatically generated">
+          <p:cNvPr id="6" name="Picture 5" descr="Chart, box and whisker chart&#10;&#10;Description automatically generated">
             <a:extLst>
               <a:ext uri="{FF2B5EF4-FFF2-40B4-BE49-F238E27FC236}">
-                <a16:creationId xmlns:a16="http://schemas.microsoft.com/office/drawing/2014/main" id="{FA259FC7-1A83-4F9A-5BF3-2C1DB82E228A}"/>
+                <a16:creationId xmlns:a16="http://schemas.microsoft.com/office/drawing/2014/main" id="{2AC2E316-23CD-5F88-43FC-AAF6AE10C234}"/>
               </a:ext>
             </a:extLst>
           </p:cNvPr>
@@ -3753,7 +3965,7 @@
           <p:nvPr/>
         </p:nvPicPr>
         <p:blipFill>
-          <a:blip r:embed="rId2">
+          <a:blip r:embed="rId3">
             <a:extLst>
               <a:ext uri="{28A0092B-C50C-407E-A947-70E740481C1C}">
                 <a14:useLocalDpi xmlns:a14="http://schemas.microsoft.com/office/drawing/2010/main" val="0"/>
@@ -3766,8 +3978,8 @@
         </p:blipFill>
         <p:spPr>
           <a:xfrm>
-            <a:off x="3796393" y="622637"/>
-            <a:ext cx="6480581" cy="4612235"/>
+            <a:off x="3996531" y="893160"/>
+            <a:ext cx="6507595" cy="4682673"/>
           </a:xfrm>
           <a:prstGeom prst="rect">
             <a:avLst/>
@@ -3776,10 +3988,10 @@
       </p:pic>
       <p:sp>
         <p:nvSpPr>
-          <p:cNvPr id="8" name="TextBox 7">
+          <p:cNvPr id="13" name="TextBox 12">
             <a:extLst>
               <a:ext uri="{FF2B5EF4-FFF2-40B4-BE49-F238E27FC236}">
-                <a16:creationId xmlns:a16="http://schemas.microsoft.com/office/drawing/2014/main" id="{F1DF0CE1-BDB7-035E-BBAD-52A05B6CA441}"/>
+                <a16:creationId xmlns:a16="http://schemas.microsoft.com/office/drawing/2014/main" id="{A6C5356D-37DF-51AF-7C57-41AC46854AC2}"/>
               </a:ext>
             </a:extLst>
           </p:cNvPr>
@@ -3788,8 +4000,8 @@
         </p:nvSpPr>
         <p:spPr>
           <a:xfrm>
-            <a:off x="2457450" y="5435144"/>
-            <a:ext cx="6480581" cy="800219"/>
+            <a:off x="326572" y="231717"/>
+            <a:ext cx="8756196" cy="523220"/>
           </a:xfrm>
           <a:prstGeom prst="rect">
             <a:avLst/>
@@ -3803,116 +4015,9 @@
           <a:lstStyle/>
           <a:p>
             <a:r>
-              <a:rPr lang="en-US" sz="1400" dirty="0"/>
-              <a:t>Important to note that “</a:t>
-            </a:r>
-            <a:r>
-              <a:rPr lang="en-US" sz="1400" dirty="0" err="1"/>
-              <a:t>Cocomelon</a:t>
-            </a:r>
-            <a:r>
-              <a:rPr lang="en-US" sz="1400" dirty="0"/>
-              <a:t>” was removed from the data for this graph, it appeared a total of 428 days out of 710. Making the Top 10 list 60% of the time</a:t>
-            </a:r>
-          </a:p>
-          <a:p>
-            <a:endParaRPr lang="en-US" dirty="0"/>
-          </a:p>
-        </p:txBody>
-      </p:sp>
-      <p:sp>
-        <p:nvSpPr>
-          <p:cNvPr id="9" name="TextBox 8">
-            <a:extLst>
-              <a:ext uri="{FF2B5EF4-FFF2-40B4-BE49-F238E27FC236}">
-                <a16:creationId xmlns:a16="http://schemas.microsoft.com/office/drawing/2014/main" id="{4C89E97F-A041-AFDD-52FB-C7A31444457D}"/>
-              </a:ext>
-            </a:extLst>
-          </p:cNvPr>
-          <p:cNvSpPr txBox="1"/>
-          <p:nvPr/>
-        </p:nvSpPr>
-        <p:spPr>
-          <a:xfrm>
-            <a:off x="174171" y="1415143"/>
-            <a:ext cx="3385458" cy="3139321"/>
-          </a:xfrm>
-          <a:prstGeom prst="rect">
-            <a:avLst/>
-          </a:prstGeom>
-          <a:noFill/>
-        </p:spPr>
-        <p:txBody>
-          <a:bodyPr wrap="square" rtlCol="0">
-            <a:spAutoFit/>
-          </a:bodyPr>
-          <a:lstStyle/>
-          <a:p>
-            <a:r>
-              <a:rPr lang="en-US" dirty="0"/>
-              <a:t>The bulk of shows were on the Top 10 list for 5 to 20 days, with frequent outliers staying much longer</a:t>
-            </a:r>
-          </a:p>
-          <a:p>
-            <a:endParaRPr lang="en-US" dirty="0"/>
-          </a:p>
-          <a:p>
-            <a:endParaRPr lang="en-US" dirty="0"/>
-          </a:p>
-          <a:p>
-            <a:endParaRPr lang="en-US" dirty="0"/>
-          </a:p>
-          <a:p>
-            <a:endParaRPr lang="en-US" dirty="0"/>
-          </a:p>
-          <a:p>
-            <a:r>
-              <a:rPr lang="en-US" dirty="0"/>
-              <a:t>Movies stayed on the Top 10 mostly for less than 10 days, and never more than 40</a:t>
-            </a:r>
-          </a:p>
-        </p:txBody>
-      </p:sp>
-      <p:sp>
-        <p:nvSpPr>
-          <p:cNvPr id="10" name="TextBox 9">
-            <a:extLst>
-              <a:ext uri="{FF2B5EF4-FFF2-40B4-BE49-F238E27FC236}">
-                <a16:creationId xmlns:a16="http://schemas.microsoft.com/office/drawing/2014/main" id="{3C404601-FFE3-1EFA-D973-711348F6A319}"/>
-              </a:ext>
-            </a:extLst>
-          </p:cNvPr>
-          <p:cNvSpPr txBox="1"/>
-          <p:nvPr/>
-        </p:nvSpPr>
-        <p:spPr>
-          <a:xfrm>
-            <a:off x="468085" y="6373586"/>
-            <a:ext cx="7184571" cy="369332"/>
-          </a:xfrm>
-          <a:prstGeom prst="rect">
-            <a:avLst/>
-          </a:prstGeom>
-          <a:noFill/>
-        </p:spPr>
-        <p:txBody>
-          <a:bodyPr wrap="square" rtlCol="0">
-            <a:spAutoFit/>
-          </a:bodyPr>
-          <a:lstStyle/>
-          <a:p>
-            <a:r>
-              <a:rPr lang="en-US" sz="1800" b="0" i="0" u="sng" strike="noStrike" dirty="0">
-                <a:solidFill>
-                  <a:srgbClr val="1155CC"/>
-                </a:solidFill>
-                <a:effectLst/>
-                <a:latin typeface="Arial" panose="020B0604020202020204" pitchFamily="34" charset="0"/>
-                <a:hlinkClick r:id="rId3"/>
-              </a:rPr>
-              <a:t>https://www.kaggle.com/datasets/prasertk/netflix-daily-top-10-in-us</a:t>
-            </a:r>
-            <a:endParaRPr lang="en-US" dirty="0"/>
+              <a:rPr lang="en-US" sz="2800" b="1" dirty="0"/>
+              <a:t>What Kind of Content Appeared in the Daily Top 10?</a:t>
+            </a:r>
           </a:p>
         </p:txBody>
       </p:sp>
@@ -3946,48 +4051,125 @@
           <a:chExt cx="0" cy="0"/>
         </a:xfrm>
       </p:grpSpPr>
-      <p:pic>
-        <p:nvPicPr>
-          <p:cNvPr id="3" name="Picture 2" descr="Chart, pie chart&#10;&#10;Description automatically generated">
+      <p:sp>
+        <p:nvSpPr>
+          <p:cNvPr id="6" name="TextBox 5">
             <a:extLst>
               <a:ext uri="{FF2B5EF4-FFF2-40B4-BE49-F238E27FC236}">
-                <a16:creationId xmlns:a16="http://schemas.microsoft.com/office/drawing/2014/main" id="{56AB9CCA-3F93-C2EC-1ACC-473A507C10F8}"/>
+                <a16:creationId xmlns:a16="http://schemas.microsoft.com/office/drawing/2014/main" id="{BEBBF6E1-E161-A5E0-B9AF-A682776013E4}"/>
               </a:ext>
             </a:extLst>
           </p:cNvPr>
-          <p:cNvPicPr>
-            <a:picLocks noChangeAspect="1"/>
-          </p:cNvPicPr>
+          <p:cNvSpPr txBox="1"/>
           <p:nvPr/>
-        </p:nvPicPr>
-        <p:blipFill>
-          <a:blip r:embed="rId2">
-            <a:extLst>
-              <a:ext uri="{28A0092B-C50C-407E-A947-70E740481C1C}">
-                <a14:useLocalDpi xmlns:a14="http://schemas.microsoft.com/office/drawing/2010/main" val="0"/>
-              </a:ext>
-            </a:extLst>
-          </a:blip>
-          <a:stretch>
-            <a:fillRect/>
-          </a:stretch>
-        </p:blipFill>
-        <p:spPr>
-          <a:xfrm>
-            <a:off x="4466214" y="769386"/>
-            <a:ext cx="4748542" cy="2659614"/>
+        </p:nvSpPr>
+        <p:spPr>
+          <a:xfrm>
+            <a:off x="220435" y="1289958"/>
+            <a:ext cx="4520294" cy="830997"/>
           </a:xfrm>
           <a:prstGeom prst="rect">
             <a:avLst/>
           </a:prstGeom>
-        </p:spPr>
-      </p:pic>
+          <a:noFill/>
+        </p:spPr>
+        <p:txBody>
+          <a:bodyPr wrap="square" rtlCol="0">
+            <a:spAutoFit/>
+          </a:bodyPr>
+          <a:lstStyle/>
+          <a:p>
+            <a:r>
+              <a:rPr lang="en-US" sz="1600" dirty="0"/>
+              <a:t>Limiting our view to only those shows and movies that were in the Top 10 for 25 days or more, we see that it is mostly shows</a:t>
+            </a:r>
+          </a:p>
+        </p:txBody>
+      </p:sp>
+      <p:sp>
+        <p:nvSpPr>
+          <p:cNvPr id="7" name="TextBox 6">
+            <a:extLst>
+              <a:ext uri="{FF2B5EF4-FFF2-40B4-BE49-F238E27FC236}">
+                <a16:creationId xmlns:a16="http://schemas.microsoft.com/office/drawing/2014/main" id="{EC5D1444-1437-3048-8A8A-E3A3DC853A37}"/>
+              </a:ext>
+            </a:extLst>
+          </p:cNvPr>
+          <p:cNvSpPr txBox="1"/>
+          <p:nvPr/>
+        </p:nvSpPr>
+        <p:spPr>
+          <a:xfrm>
+            <a:off x="220434" y="3429000"/>
+            <a:ext cx="4316186" cy="584775"/>
+          </a:xfrm>
+          <a:prstGeom prst="rect">
+            <a:avLst/>
+          </a:prstGeom>
+          <a:noFill/>
+        </p:spPr>
+        <p:txBody>
+          <a:bodyPr wrap="square" rtlCol="0">
+            <a:spAutoFit/>
+          </a:bodyPr>
+          <a:lstStyle/>
+          <a:p>
+            <a:r>
+              <a:rPr lang="en-US" sz="1600" dirty="0"/>
+              <a:t> Even though movies appeared more often in the Top 10, shows spent far more time there</a:t>
+            </a:r>
+          </a:p>
+        </p:txBody>
+      </p:sp>
+      <p:sp>
+        <p:nvSpPr>
+          <p:cNvPr id="8" name="TextBox 7">
+            <a:extLst>
+              <a:ext uri="{FF2B5EF4-FFF2-40B4-BE49-F238E27FC236}">
+                <a16:creationId xmlns:a16="http://schemas.microsoft.com/office/drawing/2014/main" id="{7C463C2E-B112-8A40-908C-F6D6F97674C8}"/>
+              </a:ext>
+            </a:extLst>
+          </p:cNvPr>
+          <p:cNvSpPr txBox="1"/>
+          <p:nvPr/>
+        </p:nvSpPr>
+        <p:spPr>
+          <a:xfrm>
+            <a:off x="468085" y="6373586"/>
+            <a:ext cx="7184571" cy="369332"/>
+          </a:xfrm>
+          <a:prstGeom prst="rect">
+            <a:avLst/>
+          </a:prstGeom>
+          <a:noFill/>
+        </p:spPr>
+        <p:txBody>
+          <a:bodyPr wrap="square" rtlCol="0">
+            <a:spAutoFit/>
+          </a:bodyPr>
+          <a:lstStyle/>
+          <a:p>
+            <a:r>
+              <a:rPr lang="en-US" sz="1800" b="0" i="0" u="sng" strike="noStrike" dirty="0">
+                <a:solidFill>
+                  <a:srgbClr val="1155CC"/>
+                </a:solidFill>
+                <a:effectLst/>
+                <a:latin typeface="Arial" panose="020B0604020202020204" pitchFamily="34" charset="0"/>
+                <a:hlinkClick r:id="rId2"/>
+              </a:rPr>
+              <a:t>https://www.kaggle.com/datasets/prasertk/netflix-daily-top-10-in-us</a:t>
+            </a:r>
+            <a:endParaRPr lang="en-US" dirty="0"/>
+          </a:p>
+        </p:txBody>
+      </p:sp>
       <p:pic>
         <p:nvPicPr>
-          <p:cNvPr id="5" name="Picture 4" descr="Chart, pie chart&#10;&#10;Description automatically generated">
+          <p:cNvPr id="4" name="Picture 3" descr="Chart, pie chart&#10;&#10;Description automatically generated">
             <a:extLst>
               <a:ext uri="{FF2B5EF4-FFF2-40B4-BE49-F238E27FC236}">
-                <a16:creationId xmlns:a16="http://schemas.microsoft.com/office/drawing/2014/main" id="{30FB95F4-2D61-02ED-A125-A9EFA458C304}"/>
+                <a16:creationId xmlns:a16="http://schemas.microsoft.com/office/drawing/2014/main" id="{668AC547-9EF6-09B9-41AC-174E3BD86DCC}"/>
               </a:ext>
             </a:extLst>
           </p:cNvPr>
@@ -4010,20 +4192,56 @@
         </p:blipFill>
         <p:spPr>
           <a:xfrm>
-            <a:off x="5169647" y="3520816"/>
-            <a:ext cx="3341676" cy="2751313"/>
+            <a:off x="5510139" y="3632321"/>
+            <a:ext cx="4641537" cy="2925931"/>
           </a:xfrm>
           <a:prstGeom prst="rect">
             <a:avLst/>
           </a:prstGeom>
         </p:spPr>
       </p:pic>
-      <p:sp>
-        <p:nvSpPr>
-          <p:cNvPr id="6" name="TextBox 5">
+      <p:pic>
+        <p:nvPicPr>
+          <p:cNvPr id="10" name="Picture 9" descr="Chart, pie chart&#10;&#10;Description automatically generated">
             <a:extLst>
               <a:ext uri="{FF2B5EF4-FFF2-40B4-BE49-F238E27FC236}">
-                <a16:creationId xmlns:a16="http://schemas.microsoft.com/office/drawing/2014/main" id="{BEBBF6E1-E161-A5E0-B9AF-A682776013E4}"/>
+                <a16:creationId xmlns:a16="http://schemas.microsoft.com/office/drawing/2014/main" id="{F616DF3A-4916-59D1-05CF-BB6C7E8F0B9F}"/>
+              </a:ext>
+            </a:extLst>
+          </p:cNvPr>
+          <p:cNvPicPr>
+            <a:picLocks noChangeAspect="1"/>
+          </p:cNvPicPr>
+          <p:nvPr/>
+        </p:nvPicPr>
+        <p:blipFill>
+          <a:blip r:embed="rId4">
+            <a:extLst>
+              <a:ext uri="{28A0092B-C50C-407E-A947-70E740481C1C}">
+                <a14:useLocalDpi xmlns:a14="http://schemas.microsoft.com/office/drawing/2010/main" val="0"/>
+              </a:ext>
+            </a:extLst>
+          </a:blip>
+          <a:stretch>
+            <a:fillRect/>
+          </a:stretch>
+        </p:blipFill>
+        <p:spPr>
+          <a:xfrm>
+            <a:off x="4452252" y="988169"/>
+            <a:ext cx="6757309" cy="2886055"/>
+          </a:xfrm>
+          <a:prstGeom prst="rect">
+            <a:avLst/>
+          </a:prstGeom>
+        </p:spPr>
+      </p:pic>
+      <p:sp>
+        <p:nvSpPr>
+          <p:cNvPr id="12" name="TextBox 11">
+            <a:extLst>
+              <a:ext uri="{FF2B5EF4-FFF2-40B4-BE49-F238E27FC236}">
+                <a16:creationId xmlns:a16="http://schemas.microsoft.com/office/drawing/2014/main" id="{53B6B6DE-182F-3409-648F-732CAEF134FC}"/>
               </a:ext>
             </a:extLst>
           </p:cNvPr>
@@ -4032,8 +4250,8 @@
         </p:nvSpPr>
         <p:spPr>
           <a:xfrm>
-            <a:off x="220435" y="1289958"/>
-            <a:ext cx="4520294" cy="830997"/>
+            <a:off x="326572" y="231717"/>
+            <a:ext cx="8756196" cy="523220"/>
           </a:xfrm>
           <a:prstGeom prst="rect">
             <a:avLst/>
@@ -4047,87 +4265,9 @@
           <a:lstStyle/>
           <a:p>
             <a:r>
-              <a:rPr lang="en-US" sz="1600" dirty="0"/>
-              <a:t>Limiting our view to only those shows and movies that were in the Top 10 for 25 days or more, we see that it is mostly shows</a:t>
-            </a:r>
-          </a:p>
-        </p:txBody>
-      </p:sp>
-      <p:sp>
-        <p:nvSpPr>
-          <p:cNvPr id="7" name="TextBox 6">
-            <a:extLst>
-              <a:ext uri="{FF2B5EF4-FFF2-40B4-BE49-F238E27FC236}">
-                <a16:creationId xmlns:a16="http://schemas.microsoft.com/office/drawing/2014/main" id="{EC5D1444-1437-3048-8A8A-E3A3DC853A37}"/>
-              </a:ext>
-            </a:extLst>
-          </p:cNvPr>
-          <p:cNvSpPr txBox="1"/>
-          <p:nvPr/>
-        </p:nvSpPr>
-        <p:spPr>
-          <a:xfrm>
-            <a:off x="220434" y="3429000"/>
-            <a:ext cx="4316186" cy="584775"/>
-          </a:xfrm>
-          <a:prstGeom prst="rect">
-            <a:avLst/>
-          </a:prstGeom>
-          <a:noFill/>
-        </p:spPr>
-        <p:txBody>
-          <a:bodyPr wrap="square" rtlCol="0">
-            <a:spAutoFit/>
-          </a:bodyPr>
-          <a:lstStyle/>
-          <a:p>
-            <a:r>
-              <a:rPr lang="en-US" sz="1600" dirty="0"/>
-              <a:t> Even though movies appeared more often in the Top 10, shows spent far more time there</a:t>
-            </a:r>
-          </a:p>
-        </p:txBody>
-      </p:sp>
-      <p:sp>
-        <p:nvSpPr>
-          <p:cNvPr id="8" name="TextBox 7">
-            <a:extLst>
-              <a:ext uri="{FF2B5EF4-FFF2-40B4-BE49-F238E27FC236}">
-                <a16:creationId xmlns:a16="http://schemas.microsoft.com/office/drawing/2014/main" id="{7C463C2E-B112-8A40-908C-F6D6F97674C8}"/>
-              </a:ext>
-            </a:extLst>
-          </p:cNvPr>
-          <p:cNvSpPr txBox="1"/>
-          <p:nvPr/>
-        </p:nvSpPr>
-        <p:spPr>
-          <a:xfrm>
-            <a:off x="468085" y="6373586"/>
-            <a:ext cx="7184571" cy="369332"/>
-          </a:xfrm>
-          <a:prstGeom prst="rect">
-            <a:avLst/>
-          </a:prstGeom>
-          <a:noFill/>
-        </p:spPr>
-        <p:txBody>
-          <a:bodyPr wrap="square" rtlCol="0">
-            <a:spAutoFit/>
-          </a:bodyPr>
-          <a:lstStyle/>
-          <a:p>
-            <a:r>
-              <a:rPr lang="en-US" sz="1800" b="0" i="0" u="sng" strike="noStrike" dirty="0">
-                <a:solidFill>
-                  <a:srgbClr val="1155CC"/>
-                </a:solidFill>
-                <a:effectLst/>
-                <a:latin typeface="Arial" panose="020B0604020202020204" pitchFamily="34" charset="0"/>
-                <a:hlinkClick r:id="rId4"/>
-              </a:rPr>
-              <a:t>https://www.kaggle.com/datasets/prasertk/netflix-daily-top-10-in-us</a:t>
-            </a:r>
-            <a:endParaRPr lang="en-US" dirty="0"/>
+              <a:rPr lang="en-US" sz="2800" b="1" dirty="0"/>
+              <a:t>What Kind of Content Appeared in the Daily Top 10?</a:t>
+            </a:r>
           </a:p>
         </p:txBody>
       </p:sp>

</xml_diff>